<commit_message>
Added food analysis to demo code
</commit_message>
<xml_diff>
--- a/Playing with NHANES.pptx
+++ b/Playing with NHANES.pptx
@@ -5,7 +5,7 @@
     <p:sldMasterId id="2147483648" r:id="rId1"/>
   </p:sldMasterIdLst>
   <p:notesMasterIdLst>
-    <p:notesMasterId r:id="rId44"/>
+    <p:notesMasterId r:id="rId50"/>
   </p:notesMasterIdLst>
   <p:sldIdLst>
     <p:sldId id="256" r:id="rId2"/>
@@ -31,25 +31,31 @@
     <p:sldId id="275" r:id="rId22"/>
     <p:sldId id="274" r:id="rId23"/>
     <p:sldId id="302" r:id="rId24"/>
-    <p:sldId id="298" r:id="rId25"/>
-    <p:sldId id="299" r:id="rId26"/>
-    <p:sldId id="300" r:id="rId27"/>
-    <p:sldId id="301" r:id="rId28"/>
-    <p:sldId id="283" r:id="rId29"/>
-    <p:sldId id="279" r:id="rId30"/>
-    <p:sldId id="280" r:id="rId31"/>
-    <p:sldId id="289" r:id="rId32"/>
-    <p:sldId id="290" r:id="rId33"/>
-    <p:sldId id="284" r:id="rId34"/>
-    <p:sldId id="277" r:id="rId35"/>
-    <p:sldId id="278" r:id="rId36"/>
-    <p:sldId id="285" r:id="rId37"/>
-    <p:sldId id="281" r:id="rId38"/>
-    <p:sldId id="282" r:id="rId39"/>
-    <p:sldId id="287" r:id="rId40"/>
-    <p:sldId id="288" r:id="rId41"/>
-    <p:sldId id="286" r:id="rId42"/>
-    <p:sldId id="303" r:id="rId43"/>
+    <p:sldId id="304" r:id="rId25"/>
+    <p:sldId id="305" r:id="rId26"/>
+    <p:sldId id="306" r:id="rId27"/>
+    <p:sldId id="307" r:id="rId28"/>
+    <p:sldId id="298" r:id="rId29"/>
+    <p:sldId id="299" r:id="rId30"/>
+    <p:sldId id="300" r:id="rId31"/>
+    <p:sldId id="301" r:id="rId32"/>
+    <p:sldId id="283" r:id="rId33"/>
+    <p:sldId id="279" r:id="rId34"/>
+    <p:sldId id="280" r:id="rId35"/>
+    <p:sldId id="289" r:id="rId36"/>
+    <p:sldId id="290" r:id="rId37"/>
+    <p:sldId id="284" r:id="rId38"/>
+    <p:sldId id="277" r:id="rId39"/>
+    <p:sldId id="278" r:id="rId40"/>
+    <p:sldId id="285" r:id="rId41"/>
+    <p:sldId id="281" r:id="rId42"/>
+    <p:sldId id="282" r:id="rId43"/>
+    <p:sldId id="287" r:id="rId44"/>
+    <p:sldId id="288" r:id="rId45"/>
+    <p:sldId id="286" r:id="rId46"/>
+    <p:sldId id="303" r:id="rId47"/>
+    <p:sldId id="308" r:id="rId48"/>
+    <p:sldId id="309" r:id="rId49"/>
   </p:sldIdLst>
   <p:sldSz cx="9144000" cy="6858000" type="screen4x3"/>
   <p:notesSz cx="6858000" cy="9144000"/>
@@ -1292,7 +1298,7 @@
           <a:p>
             <a:fld id="{6CC0C7FA-C1A4-40C0-A5BA-64F2E6BAE095}" type="slidenum">
               <a:rPr lang="en-US" smtClean="0"/>
-              <a:t>30</a:t>
+              <a:t>34</a:t>
             </a:fld>
             <a:endParaRPr lang="en-US"/>
           </a:p>
@@ -1302,6 +1308,94 @@
     <p:extLst>
       <p:ext uri="{BB962C8B-B14F-4D97-AF65-F5344CB8AC3E}">
         <p14:creationId xmlns:p14="http://schemas.microsoft.com/office/powerpoint/2010/main" val="342501464"/>
+      </p:ext>
+    </p:extLst>
+  </p:cSld>
+  <p:clrMapOvr>
+    <a:masterClrMapping/>
+  </p:clrMapOvr>
+</p:notes>
+</file>
+
+<file path=ppt/notesSlides/notesSlide8.xml><?xml version="1.0" encoding="utf-8"?>
+<p:notes xmlns:a="http://schemas.openxmlformats.org/drawingml/2006/main" xmlns:r="http://schemas.openxmlformats.org/officeDocument/2006/relationships" xmlns:p="http://schemas.openxmlformats.org/presentationml/2006/main">
+  <p:cSld>
+    <p:spTree>
+      <p:nvGrpSpPr>
+        <p:cNvPr id="1" name=""/>
+        <p:cNvGrpSpPr/>
+        <p:nvPr/>
+      </p:nvGrpSpPr>
+      <p:grpSpPr>
+        <a:xfrm>
+          <a:off x="0" y="0"/>
+          <a:ext cx="0" cy="0"/>
+          <a:chOff x="0" y="0"/>
+          <a:chExt cx="0" cy="0"/>
+        </a:xfrm>
+      </p:grpSpPr>
+      <p:sp>
+        <p:nvSpPr>
+          <p:cNvPr id="2" name="Slide Image Placeholder 1"/>
+          <p:cNvSpPr>
+            <a:spLocks noGrp="1" noRot="1" noChangeAspect="1"/>
+          </p:cNvSpPr>
+          <p:nvPr>
+            <p:ph type="sldImg"/>
+          </p:nvPr>
+        </p:nvSpPr>
+        <p:spPr/>
+      </p:sp>
+      <p:sp>
+        <p:nvSpPr>
+          <p:cNvPr id="3" name="Notes Placeholder 2"/>
+          <p:cNvSpPr>
+            <a:spLocks noGrp="1"/>
+          </p:cNvSpPr>
+          <p:nvPr>
+            <p:ph type="body" idx="1"/>
+          </p:nvPr>
+        </p:nvSpPr>
+        <p:spPr/>
+        <p:txBody>
+          <a:bodyPr/>
+          <a:lstStyle/>
+          <a:p>
+            <a:r>
+              <a:rPr lang="en-US" dirty="0" smtClean="0"/>
+              <a:t>http://45.33.82.210/</a:t>
+            </a:r>
+            <a:endParaRPr lang="en-US" dirty="0"/>
+          </a:p>
+        </p:txBody>
+      </p:sp>
+      <p:sp>
+        <p:nvSpPr>
+          <p:cNvPr id="4" name="Slide Number Placeholder 3"/>
+          <p:cNvSpPr>
+            <a:spLocks noGrp="1"/>
+          </p:cNvSpPr>
+          <p:nvPr>
+            <p:ph type="sldNum" sz="quarter" idx="10"/>
+          </p:nvPr>
+        </p:nvSpPr>
+        <p:spPr/>
+        <p:txBody>
+          <a:bodyPr/>
+          <a:lstStyle/>
+          <a:p>
+            <a:fld id="{6CC0C7FA-C1A4-40C0-A5BA-64F2E6BAE095}" type="slidenum">
+              <a:rPr lang="en-US" smtClean="0"/>
+              <a:t>46</a:t>
+            </a:fld>
+            <a:endParaRPr lang="en-US"/>
+          </a:p>
+        </p:txBody>
+      </p:sp>
+    </p:spTree>
+    <p:extLst>
+      <p:ext uri="{BB962C8B-B14F-4D97-AF65-F5344CB8AC3E}">
+        <p14:creationId xmlns:p14="http://schemas.microsoft.com/office/powerpoint/2010/main" val="3979250574"/>
       </p:ext>
     </p:extLst>
   </p:cSld>
@@ -4455,7 +4549,7 @@
           <a:p>
             <a:r>
               <a:rPr lang="en-US" dirty="0" smtClean="0"/>
-              <a:t>Playing with NHANES</a:t>
+              <a:t>Introduction to analyzing NHANES data</a:t>
             </a:r>
             <a:endParaRPr lang="en-US" dirty="0"/>
           </a:p>
@@ -4483,6 +4577,37 @@
             <a:r>
               <a:rPr lang="en-US" dirty="0" err="1" smtClean="0"/>
               <a:t>Susmann</a:t>
+            </a:r>
+            <a:endParaRPr lang="en-US" dirty="0"/>
+          </a:p>
+        </p:txBody>
+      </p:sp>
+      <p:sp>
+        <p:nvSpPr>
+          <p:cNvPr id="4" name="Rectangle 3"/>
+          <p:cNvSpPr/>
+          <p:nvPr/>
+        </p:nvSpPr>
+        <p:spPr>
+          <a:xfrm>
+            <a:off x="1828800" y="4790049"/>
+            <a:ext cx="7162800" cy="369332"/>
+          </a:xfrm>
+          <a:prstGeom prst="rect">
+            <a:avLst/>
+          </a:prstGeom>
+        </p:spPr>
+        <p:txBody>
+          <a:bodyPr wrap="square">
+            <a:spAutoFit/>
+          </a:bodyPr>
+          <a:lstStyle/>
+          <a:p>
+            <a:r>
+              <a:rPr lang="en-US" dirty="0" smtClean="0">
+                <a:hlinkClick r:id="rId2"/>
+              </a:rPr>
+              <a:t>https://github.com/SilentSpringInstitute/NHANES_Presentation</a:t>
             </a:r>
             <a:endParaRPr lang="en-US" dirty="0"/>
           </a:p>
@@ -7142,6 +7267,923 @@
       </p:grpSpPr>
       <p:sp>
         <p:nvSpPr>
+          <p:cNvPr id="4" name="Rectangle 3"/>
+          <p:cNvSpPr/>
+          <p:nvPr/>
+        </p:nvSpPr>
+        <p:spPr>
+          <a:xfrm>
+            <a:off x="-533400" y="2286000"/>
+            <a:ext cx="10134600" cy="2590800"/>
+          </a:xfrm>
+          <a:prstGeom prst="rect">
+            <a:avLst/>
+          </a:prstGeom>
+          <a:solidFill>
+            <a:srgbClr val="F5F5F5"/>
+          </a:solidFill>
+          <a:ln>
+            <a:noFill/>
+          </a:ln>
+        </p:spPr>
+        <p:style>
+          <a:lnRef idx="2">
+            <a:schemeClr val="accent1">
+              <a:shade val="50000"/>
+            </a:schemeClr>
+          </a:lnRef>
+          <a:fillRef idx="1">
+            <a:schemeClr val="accent1"/>
+          </a:fillRef>
+          <a:effectRef idx="0">
+            <a:schemeClr val="accent1"/>
+          </a:effectRef>
+          <a:fontRef idx="minor">
+            <a:schemeClr val="lt1"/>
+          </a:fontRef>
+        </p:style>
+        <p:txBody>
+          <a:bodyPr rtlCol="0" anchor="ctr"/>
+          <a:lstStyle/>
+          <a:p>
+            <a:pPr algn="ctr"/>
+            <a:endParaRPr lang="en-US"/>
+          </a:p>
+        </p:txBody>
+      </p:sp>
+      <p:sp>
+        <p:nvSpPr>
+          <p:cNvPr id="2" name="Title 1"/>
+          <p:cNvSpPr>
+            <a:spLocks noGrp="1"/>
+          </p:cNvSpPr>
+          <p:nvPr>
+            <p:ph type="title"/>
+          </p:nvPr>
+        </p:nvSpPr>
+        <p:spPr/>
+        <p:txBody>
+          <a:bodyPr/>
+          <a:lstStyle/>
+          <a:p>
+            <a:r>
+              <a:rPr lang="en-US" dirty="0" smtClean="0"/>
+              <a:t>Motivating Example: PFCs</a:t>
+            </a:r>
+            <a:endParaRPr lang="en-US" dirty="0"/>
+          </a:p>
+        </p:txBody>
+      </p:sp>
+      <p:pic>
+        <p:nvPicPr>
+          <p:cNvPr id="22530" name="Picture 2" descr="Imgsrv"/>
+          <p:cNvPicPr>
+            <a:picLocks noChangeAspect="1" noChangeArrowheads="1"/>
+          </p:cNvPicPr>
+          <p:nvPr/>
+        </p:nvPicPr>
+        <p:blipFill>
+          <a:blip r:embed="rId2">
+            <a:extLst>
+              <a:ext uri="{28A0092B-C50C-407E-A947-70E740481C1C}">
+                <a14:useLocalDpi xmlns:a14="http://schemas.microsoft.com/office/drawing/2010/main" val="0"/>
+              </a:ext>
+            </a:extLst>
+          </a:blip>
+          <a:srcRect/>
+          <a:stretch>
+            <a:fillRect/>
+          </a:stretch>
+        </p:blipFill>
+        <p:spPr bwMode="auto">
+          <a:xfrm>
+            <a:off x="808990" y="2527024"/>
+            <a:ext cx="952500" cy="952500"/>
+          </a:xfrm>
+          <a:prstGeom prst="rect">
+            <a:avLst/>
+          </a:prstGeom>
+          <a:noFill/>
+          <a:extLst>
+            <a:ext uri="{909E8E84-426E-40DD-AFC4-6F175D3DCCD1}">
+              <a14:hiddenFill xmlns:a14="http://schemas.microsoft.com/office/drawing/2010/main">
+                <a:solidFill>
+                  <a:srgbClr val="FFFFFF"/>
+                </a:solidFill>
+              </a14:hiddenFill>
+            </a:ext>
+          </a:extLst>
+        </p:spPr>
+      </p:pic>
+      <p:pic>
+        <p:nvPicPr>
+          <p:cNvPr id="22532" name="Picture 4" descr="Imgsrv"/>
+          <p:cNvPicPr>
+            <a:picLocks noChangeAspect="1" noChangeArrowheads="1"/>
+          </p:cNvPicPr>
+          <p:nvPr/>
+        </p:nvPicPr>
+        <p:blipFill>
+          <a:blip r:embed="rId3">
+            <a:extLst>
+              <a:ext uri="{28A0092B-C50C-407E-A947-70E740481C1C}">
+                <a14:useLocalDpi xmlns:a14="http://schemas.microsoft.com/office/drawing/2010/main" val="0"/>
+              </a:ext>
+            </a:extLst>
+          </a:blip>
+          <a:srcRect/>
+          <a:stretch>
+            <a:fillRect/>
+          </a:stretch>
+        </p:blipFill>
+        <p:spPr bwMode="auto">
+          <a:xfrm>
+            <a:off x="2157095" y="2527024"/>
+            <a:ext cx="952500" cy="952500"/>
+          </a:xfrm>
+          <a:prstGeom prst="rect">
+            <a:avLst/>
+          </a:prstGeom>
+          <a:noFill/>
+          <a:extLst>
+            <a:ext uri="{909E8E84-426E-40DD-AFC4-6F175D3DCCD1}">
+              <a14:hiddenFill xmlns:a14="http://schemas.microsoft.com/office/drawing/2010/main">
+                <a:solidFill>
+                  <a:srgbClr val="FFFFFF"/>
+                </a:solidFill>
+              </a14:hiddenFill>
+            </a:ext>
+          </a:extLst>
+        </p:spPr>
+      </p:pic>
+      <p:pic>
+        <p:nvPicPr>
+          <p:cNvPr id="22534" name="Picture 6" descr="Imgsrv"/>
+          <p:cNvPicPr>
+            <a:picLocks noChangeAspect="1" noChangeArrowheads="1"/>
+          </p:cNvPicPr>
+          <p:nvPr/>
+        </p:nvPicPr>
+        <p:blipFill>
+          <a:blip r:embed="rId4">
+            <a:extLst>
+              <a:ext uri="{28A0092B-C50C-407E-A947-70E740481C1C}">
+                <a14:useLocalDpi xmlns:a14="http://schemas.microsoft.com/office/drawing/2010/main" val="0"/>
+              </a:ext>
+            </a:extLst>
+          </a:blip>
+          <a:srcRect/>
+          <a:stretch>
+            <a:fillRect/>
+          </a:stretch>
+        </p:blipFill>
+        <p:spPr bwMode="auto">
+          <a:xfrm>
+            <a:off x="3505200" y="2527024"/>
+            <a:ext cx="952500" cy="952500"/>
+          </a:xfrm>
+          <a:prstGeom prst="rect">
+            <a:avLst/>
+          </a:prstGeom>
+          <a:noFill/>
+          <a:extLst>
+            <a:ext uri="{909E8E84-426E-40DD-AFC4-6F175D3DCCD1}">
+              <a14:hiddenFill xmlns:a14="http://schemas.microsoft.com/office/drawing/2010/main">
+                <a:solidFill>
+                  <a:srgbClr val="FFFFFF"/>
+                </a:solidFill>
+              </a14:hiddenFill>
+            </a:ext>
+          </a:extLst>
+        </p:spPr>
+      </p:pic>
+      <p:pic>
+        <p:nvPicPr>
+          <p:cNvPr id="22536" name="Picture 8" descr="Imgsrv"/>
+          <p:cNvPicPr>
+            <a:picLocks noChangeAspect="1" noChangeArrowheads="1"/>
+          </p:cNvPicPr>
+          <p:nvPr/>
+        </p:nvPicPr>
+        <p:blipFill>
+          <a:blip r:embed="rId5">
+            <a:extLst>
+              <a:ext uri="{28A0092B-C50C-407E-A947-70E740481C1C}">
+                <a14:useLocalDpi xmlns:a14="http://schemas.microsoft.com/office/drawing/2010/main" val="0"/>
+              </a:ext>
+            </a:extLst>
+          </a:blip>
+          <a:srcRect/>
+          <a:stretch>
+            <a:fillRect/>
+          </a:stretch>
+        </p:blipFill>
+        <p:spPr bwMode="auto">
+          <a:xfrm>
+            <a:off x="4853305" y="2527024"/>
+            <a:ext cx="952500" cy="952500"/>
+          </a:xfrm>
+          <a:prstGeom prst="rect">
+            <a:avLst/>
+          </a:prstGeom>
+          <a:noFill/>
+          <a:extLst>
+            <a:ext uri="{909E8E84-426E-40DD-AFC4-6F175D3DCCD1}">
+              <a14:hiddenFill xmlns:a14="http://schemas.microsoft.com/office/drawing/2010/main">
+                <a:solidFill>
+                  <a:srgbClr val="FFFFFF"/>
+                </a:solidFill>
+              </a14:hiddenFill>
+            </a:ext>
+          </a:extLst>
+        </p:spPr>
+      </p:pic>
+      <p:pic>
+        <p:nvPicPr>
+          <p:cNvPr id="22538" name="Picture 10" descr="Imgsrv"/>
+          <p:cNvPicPr>
+            <a:picLocks noChangeAspect="1" noChangeArrowheads="1"/>
+          </p:cNvPicPr>
+          <p:nvPr/>
+        </p:nvPicPr>
+        <p:blipFill>
+          <a:blip r:embed="rId6">
+            <a:extLst>
+              <a:ext uri="{28A0092B-C50C-407E-A947-70E740481C1C}">
+                <a14:useLocalDpi xmlns:a14="http://schemas.microsoft.com/office/drawing/2010/main" val="0"/>
+              </a:ext>
+            </a:extLst>
+          </a:blip>
+          <a:srcRect/>
+          <a:stretch>
+            <a:fillRect/>
+          </a:stretch>
+        </p:blipFill>
+        <p:spPr bwMode="auto">
+          <a:xfrm>
+            <a:off x="6201410" y="2527024"/>
+            <a:ext cx="952500" cy="952500"/>
+          </a:xfrm>
+          <a:prstGeom prst="rect">
+            <a:avLst/>
+          </a:prstGeom>
+          <a:noFill/>
+          <a:extLst>
+            <a:ext uri="{909E8E84-426E-40DD-AFC4-6F175D3DCCD1}">
+              <a14:hiddenFill xmlns:a14="http://schemas.microsoft.com/office/drawing/2010/main">
+                <a:solidFill>
+                  <a:srgbClr val="FFFFFF"/>
+                </a:solidFill>
+              </a14:hiddenFill>
+            </a:ext>
+          </a:extLst>
+        </p:spPr>
+      </p:pic>
+      <p:pic>
+        <p:nvPicPr>
+          <p:cNvPr id="22540" name="Picture 12" descr="Imgsrv"/>
+          <p:cNvPicPr>
+            <a:picLocks noChangeAspect="1" noChangeArrowheads="1"/>
+          </p:cNvPicPr>
+          <p:nvPr/>
+        </p:nvPicPr>
+        <p:blipFill>
+          <a:blip r:embed="rId7">
+            <a:extLst>
+              <a:ext uri="{28A0092B-C50C-407E-A947-70E740481C1C}">
+                <a14:useLocalDpi xmlns:a14="http://schemas.microsoft.com/office/drawing/2010/main" val="0"/>
+              </a:ext>
+            </a:extLst>
+          </a:blip>
+          <a:srcRect/>
+          <a:stretch>
+            <a:fillRect/>
+          </a:stretch>
+        </p:blipFill>
+        <p:spPr bwMode="auto">
+          <a:xfrm>
+            <a:off x="7549515" y="2527024"/>
+            <a:ext cx="952500" cy="952500"/>
+          </a:xfrm>
+          <a:prstGeom prst="rect">
+            <a:avLst/>
+          </a:prstGeom>
+          <a:noFill/>
+          <a:extLst>
+            <a:ext uri="{909E8E84-426E-40DD-AFC4-6F175D3DCCD1}">
+              <a14:hiddenFill xmlns:a14="http://schemas.microsoft.com/office/drawing/2010/main">
+                <a:solidFill>
+                  <a:srgbClr val="FFFFFF"/>
+                </a:solidFill>
+              </a14:hiddenFill>
+            </a:ext>
+          </a:extLst>
+        </p:spPr>
+      </p:pic>
+      <p:pic>
+        <p:nvPicPr>
+          <p:cNvPr id="22542" name="Picture 14" descr="Imgsrv"/>
+          <p:cNvPicPr>
+            <a:picLocks noChangeAspect="1" noChangeArrowheads="1"/>
+          </p:cNvPicPr>
+          <p:nvPr/>
+        </p:nvPicPr>
+        <p:blipFill>
+          <a:blip r:embed="rId8">
+            <a:extLst>
+              <a:ext uri="{28A0092B-C50C-407E-A947-70E740481C1C}">
+                <a14:useLocalDpi xmlns:a14="http://schemas.microsoft.com/office/drawing/2010/main" val="0"/>
+              </a:ext>
+            </a:extLst>
+          </a:blip>
+          <a:srcRect/>
+          <a:stretch>
+            <a:fillRect/>
+          </a:stretch>
+        </p:blipFill>
+        <p:spPr bwMode="auto">
+          <a:xfrm>
+            <a:off x="808990" y="3593824"/>
+            <a:ext cx="952500" cy="952500"/>
+          </a:xfrm>
+          <a:prstGeom prst="rect">
+            <a:avLst/>
+          </a:prstGeom>
+          <a:noFill/>
+          <a:extLst>
+            <a:ext uri="{909E8E84-426E-40DD-AFC4-6F175D3DCCD1}">
+              <a14:hiddenFill xmlns:a14="http://schemas.microsoft.com/office/drawing/2010/main">
+                <a:solidFill>
+                  <a:srgbClr val="FFFFFF"/>
+                </a:solidFill>
+              </a14:hiddenFill>
+            </a:ext>
+          </a:extLst>
+        </p:spPr>
+      </p:pic>
+      <p:pic>
+        <p:nvPicPr>
+          <p:cNvPr id="22544" name="Picture 16" descr="Imgsrv"/>
+          <p:cNvPicPr>
+            <a:picLocks noChangeAspect="1" noChangeArrowheads="1"/>
+          </p:cNvPicPr>
+          <p:nvPr/>
+        </p:nvPicPr>
+        <p:blipFill>
+          <a:blip r:embed="rId9">
+            <a:extLst>
+              <a:ext uri="{28A0092B-C50C-407E-A947-70E740481C1C}">
+                <a14:useLocalDpi xmlns:a14="http://schemas.microsoft.com/office/drawing/2010/main" val="0"/>
+              </a:ext>
+            </a:extLst>
+          </a:blip>
+          <a:srcRect/>
+          <a:stretch>
+            <a:fillRect/>
+          </a:stretch>
+        </p:blipFill>
+        <p:spPr bwMode="auto">
+          <a:xfrm>
+            <a:off x="2157095" y="3593824"/>
+            <a:ext cx="952500" cy="952500"/>
+          </a:xfrm>
+          <a:prstGeom prst="rect">
+            <a:avLst/>
+          </a:prstGeom>
+          <a:noFill/>
+          <a:extLst>
+            <a:ext uri="{909E8E84-426E-40DD-AFC4-6F175D3DCCD1}">
+              <a14:hiddenFill xmlns:a14="http://schemas.microsoft.com/office/drawing/2010/main">
+                <a:solidFill>
+                  <a:srgbClr val="FFFFFF"/>
+                </a:solidFill>
+              </a14:hiddenFill>
+            </a:ext>
+          </a:extLst>
+        </p:spPr>
+      </p:pic>
+      <p:pic>
+        <p:nvPicPr>
+          <p:cNvPr id="22546" name="Picture 18" descr="Imgsrv"/>
+          <p:cNvPicPr>
+            <a:picLocks noChangeAspect="1" noChangeArrowheads="1"/>
+          </p:cNvPicPr>
+          <p:nvPr/>
+        </p:nvPicPr>
+        <p:blipFill>
+          <a:blip r:embed="rId10">
+            <a:extLst>
+              <a:ext uri="{28A0092B-C50C-407E-A947-70E740481C1C}">
+                <a14:useLocalDpi xmlns:a14="http://schemas.microsoft.com/office/drawing/2010/main" val="0"/>
+              </a:ext>
+            </a:extLst>
+          </a:blip>
+          <a:srcRect/>
+          <a:stretch>
+            <a:fillRect/>
+          </a:stretch>
+        </p:blipFill>
+        <p:spPr bwMode="auto">
+          <a:xfrm>
+            <a:off x="3505200" y="3593824"/>
+            <a:ext cx="952500" cy="952500"/>
+          </a:xfrm>
+          <a:prstGeom prst="rect">
+            <a:avLst/>
+          </a:prstGeom>
+          <a:noFill/>
+          <a:extLst>
+            <a:ext uri="{909E8E84-426E-40DD-AFC4-6F175D3DCCD1}">
+              <a14:hiddenFill xmlns:a14="http://schemas.microsoft.com/office/drawing/2010/main">
+                <a:solidFill>
+                  <a:srgbClr val="FFFFFF"/>
+                </a:solidFill>
+              </a14:hiddenFill>
+            </a:ext>
+          </a:extLst>
+        </p:spPr>
+      </p:pic>
+      <p:pic>
+        <p:nvPicPr>
+          <p:cNvPr id="22548" name="Picture 20" descr="Imgsrv"/>
+          <p:cNvPicPr>
+            <a:picLocks noChangeAspect="1" noChangeArrowheads="1"/>
+          </p:cNvPicPr>
+          <p:nvPr/>
+        </p:nvPicPr>
+        <p:blipFill>
+          <a:blip r:embed="rId11">
+            <a:extLst>
+              <a:ext uri="{28A0092B-C50C-407E-A947-70E740481C1C}">
+                <a14:useLocalDpi xmlns:a14="http://schemas.microsoft.com/office/drawing/2010/main" val="0"/>
+              </a:ext>
+            </a:extLst>
+          </a:blip>
+          <a:srcRect/>
+          <a:stretch>
+            <a:fillRect/>
+          </a:stretch>
+        </p:blipFill>
+        <p:spPr bwMode="auto">
+          <a:xfrm>
+            <a:off x="4853305" y="3593824"/>
+            <a:ext cx="952500" cy="952500"/>
+          </a:xfrm>
+          <a:prstGeom prst="rect">
+            <a:avLst/>
+          </a:prstGeom>
+          <a:noFill/>
+          <a:extLst>
+            <a:ext uri="{909E8E84-426E-40DD-AFC4-6F175D3DCCD1}">
+              <a14:hiddenFill xmlns:a14="http://schemas.microsoft.com/office/drawing/2010/main">
+                <a:solidFill>
+                  <a:srgbClr val="FFFFFF"/>
+                </a:solidFill>
+              </a14:hiddenFill>
+            </a:ext>
+          </a:extLst>
+        </p:spPr>
+      </p:pic>
+      <p:pic>
+        <p:nvPicPr>
+          <p:cNvPr id="22550" name="Picture 22" descr="Imgsrv"/>
+          <p:cNvPicPr>
+            <a:picLocks noChangeAspect="1" noChangeArrowheads="1"/>
+          </p:cNvPicPr>
+          <p:nvPr/>
+        </p:nvPicPr>
+        <p:blipFill>
+          <a:blip r:embed="rId12">
+            <a:extLst>
+              <a:ext uri="{28A0092B-C50C-407E-A947-70E740481C1C}">
+                <a14:useLocalDpi xmlns:a14="http://schemas.microsoft.com/office/drawing/2010/main" val="0"/>
+              </a:ext>
+            </a:extLst>
+          </a:blip>
+          <a:srcRect/>
+          <a:stretch>
+            <a:fillRect/>
+          </a:stretch>
+        </p:blipFill>
+        <p:spPr bwMode="auto">
+          <a:xfrm>
+            <a:off x="6201410" y="3593824"/>
+            <a:ext cx="952500" cy="952500"/>
+          </a:xfrm>
+          <a:prstGeom prst="rect">
+            <a:avLst/>
+          </a:prstGeom>
+          <a:noFill/>
+          <a:extLst>
+            <a:ext uri="{909E8E84-426E-40DD-AFC4-6F175D3DCCD1}">
+              <a14:hiddenFill xmlns:a14="http://schemas.microsoft.com/office/drawing/2010/main">
+                <a:solidFill>
+                  <a:srgbClr val="FFFFFF"/>
+                </a:solidFill>
+              </a14:hiddenFill>
+            </a:ext>
+          </a:extLst>
+        </p:spPr>
+      </p:pic>
+    </p:spTree>
+    <p:extLst>
+      <p:ext uri="{BB962C8B-B14F-4D97-AF65-F5344CB8AC3E}">
+        <p14:creationId xmlns:p14="http://schemas.microsoft.com/office/powerpoint/2010/main" val="1489419012"/>
+      </p:ext>
+    </p:extLst>
+  </p:cSld>
+  <p:clrMapOvr>
+    <a:masterClrMapping/>
+  </p:clrMapOvr>
+  <p:timing>
+    <p:tnLst>
+      <p:par>
+        <p:cTn id="1" dur="indefinite" restart="never" nodeType="tmRoot"/>
+      </p:par>
+    </p:tnLst>
+  </p:timing>
+</p:sld>
+</file>
+
+<file path=ppt/slides/slide25.xml><?xml version="1.0" encoding="utf-8"?>
+<p:sld xmlns:a="http://schemas.openxmlformats.org/drawingml/2006/main" xmlns:r="http://schemas.openxmlformats.org/officeDocument/2006/relationships" xmlns:p="http://schemas.openxmlformats.org/presentationml/2006/main">
+  <p:cSld>
+    <p:spTree>
+      <p:nvGrpSpPr>
+        <p:cNvPr id="1" name=""/>
+        <p:cNvGrpSpPr/>
+        <p:nvPr/>
+      </p:nvGrpSpPr>
+      <p:grpSpPr>
+        <a:xfrm>
+          <a:off x="0" y="0"/>
+          <a:ext cx="0" cy="0"/>
+          <a:chOff x="0" y="0"/>
+          <a:chExt cx="0" cy="0"/>
+        </a:xfrm>
+      </p:grpSpPr>
+      <p:pic>
+        <p:nvPicPr>
+          <p:cNvPr id="26626" name="Picture 2"/>
+          <p:cNvPicPr>
+            <a:picLocks noChangeAspect="1" noChangeArrowheads="1"/>
+          </p:cNvPicPr>
+          <p:nvPr/>
+        </p:nvPicPr>
+        <p:blipFill>
+          <a:blip r:embed="rId2">
+            <a:extLst>
+              <a:ext uri="{28A0092B-C50C-407E-A947-70E740481C1C}">
+                <a14:useLocalDpi xmlns:a14="http://schemas.microsoft.com/office/drawing/2010/main" val="0"/>
+              </a:ext>
+            </a:extLst>
+          </a:blip>
+          <a:srcRect/>
+          <a:stretch>
+            <a:fillRect/>
+          </a:stretch>
+        </p:blipFill>
+        <p:spPr bwMode="auto">
+          <a:xfrm>
+            <a:off x="1752600" y="167942"/>
+            <a:ext cx="5986462" cy="6156658"/>
+          </a:xfrm>
+          <a:prstGeom prst="rect">
+            <a:avLst/>
+          </a:prstGeom>
+          <a:noFill/>
+          <a:ln>
+            <a:noFill/>
+          </a:ln>
+          <a:extLst>
+            <a:ext uri="{909E8E84-426E-40DD-AFC4-6F175D3DCCD1}">
+              <a14:hiddenFill xmlns:a14="http://schemas.microsoft.com/office/drawing/2010/main">
+                <a:solidFill>
+                  <a:schemeClr val="accent1"/>
+                </a:solidFill>
+              </a14:hiddenFill>
+            </a:ext>
+            <a:ext uri="{91240B29-F687-4F45-9708-019B960494DF}">
+              <a14:hiddenLine xmlns:a14="http://schemas.microsoft.com/office/drawing/2010/main" w="9525">
+                <a:solidFill>
+                  <a:schemeClr val="tx1"/>
+                </a:solidFill>
+                <a:miter lim="800000"/>
+                <a:headEnd/>
+                <a:tailEnd/>
+              </a14:hiddenLine>
+            </a:ext>
+          </a:extLst>
+        </p:spPr>
+      </p:pic>
+      <p:sp>
+        <p:nvSpPr>
+          <p:cNvPr id="4" name="Rectangle 3"/>
+          <p:cNvSpPr/>
+          <p:nvPr/>
+        </p:nvSpPr>
+        <p:spPr>
+          <a:xfrm>
+            <a:off x="2819400" y="6124545"/>
+            <a:ext cx="6298096" cy="246221"/>
+          </a:xfrm>
+          <a:prstGeom prst="rect">
+            <a:avLst/>
+          </a:prstGeom>
+        </p:spPr>
+        <p:txBody>
+          <a:bodyPr wrap="square">
+            <a:spAutoFit/>
+          </a:bodyPr>
+          <a:lstStyle/>
+          <a:p>
+            <a:r>
+              <a:rPr lang="en-US" sz="1000" dirty="0" smtClean="0"/>
+              <a:t>http://www.npr.org/2016/03/31/472501029/elevated-levels-of-suspected-carcinogen-found-in-states-drinking-water</a:t>
+            </a:r>
+            <a:endParaRPr lang="en-US" sz="1000" dirty="0"/>
+          </a:p>
+        </p:txBody>
+      </p:sp>
+    </p:spTree>
+    <p:extLst>
+      <p:ext uri="{BB962C8B-B14F-4D97-AF65-F5344CB8AC3E}">
+        <p14:creationId xmlns:p14="http://schemas.microsoft.com/office/powerpoint/2010/main" val="3637417750"/>
+      </p:ext>
+    </p:extLst>
+  </p:cSld>
+  <p:clrMapOvr>
+    <a:masterClrMapping/>
+  </p:clrMapOvr>
+  <p:timing>
+    <p:tnLst>
+      <p:par>
+        <p:cTn id="1" dur="indefinite" restart="never" nodeType="tmRoot"/>
+      </p:par>
+    </p:tnLst>
+  </p:timing>
+</p:sld>
+</file>
+
+<file path=ppt/slides/slide26.xml><?xml version="1.0" encoding="utf-8"?>
+<p:sld xmlns:a="http://schemas.openxmlformats.org/drawingml/2006/main" xmlns:r="http://schemas.openxmlformats.org/officeDocument/2006/relationships" xmlns:p="http://schemas.openxmlformats.org/presentationml/2006/main">
+  <p:cSld>
+    <p:spTree>
+      <p:nvGrpSpPr>
+        <p:cNvPr id="1" name=""/>
+        <p:cNvGrpSpPr/>
+        <p:nvPr/>
+      </p:nvGrpSpPr>
+      <p:grpSpPr>
+        <a:xfrm>
+          <a:off x="0" y="0"/>
+          <a:ext cx="0" cy="0"/>
+          <a:chOff x="0" y="0"/>
+          <a:chExt cx="0" cy="0"/>
+        </a:xfrm>
+      </p:grpSpPr>
+      <p:pic>
+        <p:nvPicPr>
+          <p:cNvPr id="27650" name="Picture 2"/>
+          <p:cNvPicPr>
+            <a:picLocks noChangeAspect="1" noChangeArrowheads="1"/>
+          </p:cNvPicPr>
+          <p:nvPr/>
+        </p:nvPicPr>
+        <p:blipFill>
+          <a:blip r:embed="rId2">
+            <a:extLst>
+              <a:ext uri="{28A0092B-C50C-407E-A947-70E740481C1C}">
+                <a14:useLocalDpi xmlns:a14="http://schemas.microsoft.com/office/drawing/2010/main" val="0"/>
+              </a:ext>
+            </a:extLst>
+          </a:blip>
+          <a:srcRect/>
+          <a:stretch>
+            <a:fillRect/>
+          </a:stretch>
+        </p:blipFill>
+        <p:spPr bwMode="auto">
+          <a:xfrm>
+            <a:off x="623888" y="604838"/>
+            <a:ext cx="7896225" cy="5648325"/>
+          </a:xfrm>
+          <a:prstGeom prst="rect">
+            <a:avLst/>
+          </a:prstGeom>
+          <a:noFill/>
+          <a:ln>
+            <a:noFill/>
+          </a:ln>
+          <a:extLst>
+            <a:ext uri="{909E8E84-426E-40DD-AFC4-6F175D3DCCD1}">
+              <a14:hiddenFill xmlns:a14="http://schemas.microsoft.com/office/drawing/2010/main">
+                <a:solidFill>
+                  <a:schemeClr val="accent1"/>
+                </a:solidFill>
+              </a14:hiddenFill>
+            </a:ext>
+            <a:ext uri="{91240B29-F687-4F45-9708-019B960494DF}">
+              <a14:hiddenLine xmlns:a14="http://schemas.microsoft.com/office/drawing/2010/main" w="9525">
+                <a:solidFill>
+                  <a:schemeClr val="tx1"/>
+                </a:solidFill>
+                <a:miter lim="800000"/>
+                <a:headEnd/>
+                <a:tailEnd/>
+              </a14:hiddenLine>
+            </a:ext>
+          </a:extLst>
+        </p:spPr>
+      </p:pic>
+      <p:sp>
+        <p:nvSpPr>
+          <p:cNvPr id="4" name="Rectangle 3"/>
+          <p:cNvSpPr/>
+          <p:nvPr/>
+        </p:nvSpPr>
+        <p:spPr>
+          <a:xfrm>
+            <a:off x="2895600" y="5985007"/>
+            <a:ext cx="6705600" cy="246221"/>
+          </a:xfrm>
+          <a:prstGeom prst="rect">
+            <a:avLst/>
+          </a:prstGeom>
+        </p:spPr>
+        <p:txBody>
+          <a:bodyPr wrap="square">
+            <a:spAutoFit/>
+          </a:bodyPr>
+          <a:lstStyle/>
+          <a:p>
+            <a:r>
+              <a:rPr lang="en-US" sz="1000" dirty="0" smtClean="0"/>
+              <a:t>http://www.kktv.com/content/news/Military-Peterson-Air-Force-Base-may-have-released-PFCs-390469582.html</a:t>
+            </a:r>
+            <a:endParaRPr lang="en-US" sz="1000" dirty="0"/>
+          </a:p>
+        </p:txBody>
+      </p:sp>
+    </p:spTree>
+    <p:extLst>
+      <p:ext uri="{BB962C8B-B14F-4D97-AF65-F5344CB8AC3E}">
+        <p14:creationId xmlns:p14="http://schemas.microsoft.com/office/powerpoint/2010/main" val="3304688973"/>
+      </p:ext>
+    </p:extLst>
+  </p:cSld>
+  <p:clrMapOvr>
+    <a:masterClrMapping/>
+  </p:clrMapOvr>
+  <p:timing>
+    <p:tnLst>
+      <p:par>
+        <p:cTn id="1" dur="indefinite" restart="never" nodeType="tmRoot"/>
+      </p:par>
+    </p:tnLst>
+  </p:timing>
+</p:sld>
+</file>
+
+<file path=ppt/slides/slide27.xml><?xml version="1.0" encoding="utf-8"?>
+<p:sld xmlns:a="http://schemas.openxmlformats.org/drawingml/2006/main" xmlns:r="http://schemas.openxmlformats.org/officeDocument/2006/relationships" xmlns:p="http://schemas.openxmlformats.org/presentationml/2006/main">
+  <p:cSld>
+    <p:spTree>
+      <p:nvGrpSpPr>
+        <p:cNvPr id="1" name=""/>
+        <p:cNvGrpSpPr/>
+        <p:nvPr/>
+      </p:nvGrpSpPr>
+      <p:grpSpPr>
+        <a:xfrm>
+          <a:off x="0" y="0"/>
+          <a:ext cx="0" cy="0"/>
+          <a:chOff x="0" y="0"/>
+          <a:chExt cx="0" cy="0"/>
+        </a:xfrm>
+      </p:grpSpPr>
+      <p:pic>
+        <p:nvPicPr>
+          <p:cNvPr id="28674" name="Picture 2"/>
+          <p:cNvPicPr>
+            <a:picLocks noChangeAspect="1" noChangeArrowheads="1"/>
+          </p:cNvPicPr>
+          <p:nvPr/>
+        </p:nvPicPr>
+        <p:blipFill>
+          <a:blip r:embed="rId2">
+            <a:extLst>
+              <a:ext uri="{28A0092B-C50C-407E-A947-70E740481C1C}">
+                <a14:useLocalDpi xmlns:a14="http://schemas.microsoft.com/office/drawing/2010/main" val="0"/>
+              </a:ext>
+            </a:extLst>
+          </a:blip>
+          <a:srcRect/>
+          <a:stretch>
+            <a:fillRect/>
+          </a:stretch>
+        </p:blipFill>
+        <p:spPr bwMode="auto">
+          <a:xfrm>
+            <a:off x="-72473" y="1828800"/>
+            <a:ext cx="9229725" cy="3095625"/>
+          </a:xfrm>
+          <a:prstGeom prst="rect">
+            <a:avLst/>
+          </a:prstGeom>
+          <a:noFill/>
+          <a:ln>
+            <a:noFill/>
+          </a:ln>
+          <a:extLst>
+            <a:ext uri="{909E8E84-426E-40DD-AFC4-6F175D3DCCD1}">
+              <a14:hiddenFill xmlns:a14="http://schemas.microsoft.com/office/drawing/2010/main">
+                <a:solidFill>
+                  <a:schemeClr val="accent1"/>
+                </a:solidFill>
+              </a14:hiddenFill>
+            </a:ext>
+            <a:ext uri="{91240B29-F687-4F45-9708-019B960494DF}">
+              <a14:hiddenLine xmlns:a14="http://schemas.microsoft.com/office/drawing/2010/main" w="9525">
+                <a:solidFill>
+                  <a:schemeClr val="tx1"/>
+                </a:solidFill>
+                <a:miter lim="800000"/>
+                <a:headEnd/>
+                <a:tailEnd/>
+              </a14:hiddenLine>
+            </a:ext>
+          </a:extLst>
+        </p:spPr>
+      </p:pic>
+      <p:sp>
+        <p:nvSpPr>
+          <p:cNvPr id="4" name="Rectangle 3"/>
+          <p:cNvSpPr/>
+          <p:nvPr/>
+        </p:nvSpPr>
+        <p:spPr>
+          <a:xfrm>
+            <a:off x="5257800" y="6122504"/>
+            <a:ext cx="4572000" cy="246221"/>
+          </a:xfrm>
+          <a:prstGeom prst="rect">
+            <a:avLst/>
+          </a:prstGeom>
+        </p:spPr>
+        <p:txBody>
+          <a:bodyPr>
+            <a:spAutoFit/>
+          </a:bodyPr>
+          <a:lstStyle/>
+          <a:p>
+            <a:r>
+              <a:rPr lang="en-US" sz="1000" dirty="0" smtClean="0"/>
+              <a:t>http://www.seacoastonline.com/article/20160519/NEWS/160518936</a:t>
+            </a:r>
+            <a:endParaRPr lang="en-US" sz="1000" dirty="0"/>
+          </a:p>
+        </p:txBody>
+      </p:sp>
+    </p:spTree>
+    <p:extLst>
+      <p:ext uri="{BB962C8B-B14F-4D97-AF65-F5344CB8AC3E}">
+        <p14:creationId xmlns:p14="http://schemas.microsoft.com/office/powerpoint/2010/main" val="3705488187"/>
+      </p:ext>
+    </p:extLst>
+  </p:cSld>
+  <p:clrMapOvr>
+    <a:masterClrMapping/>
+  </p:clrMapOvr>
+  <p:timing>
+    <p:tnLst>
+      <p:par>
+        <p:cTn id="1" dur="indefinite" restart="never" nodeType="tmRoot"/>
+      </p:par>
+    </p:tnLst>
+  </p:timing>
+</p:sld>
+</file>
+
+<file path=ppt/slides/slide28.xml><?xml version="1.0" encoding="utf-8"?>
+<p:sld xmlns:a="http://schemas.openxmlformats.org/drawingml/2006/main" xmlns:r="http://schemas.openxmlformats.org/officeDocument/2006/relationships" xmlns:p="http://schemas.openxmlformats.org/presentationml/2006/main">
+  <p:cSld>
+    <p:spTree>
+      <p:nvGrpSpPr>
+        <p:cNvPr id="1" name=""/>
+        <p:cNvGrpSpPr/>
+        <p:nvPr/>
+      </p:nvGrpSpPr>
+      <p:grpSpPr>
+        <a:xfrm>
+          <a:off x="0" y="0"/>
+          <a:ext cx="0" cy="0"/>
+          <a:chOff x="0" y="0"/>
+          <a:chExt cx="0" cy="0"/>
+        </a:xfrm>
+      </p:grpSpPr>
+      <p:sp>
+        <p:nvSpPr>
           <p:cNvPr id="2" name="Title 1"/>
           <p:cNvSpPr>
             <a:spLocks noGrp="1"/>
@@ -7188,7 +8230,7 @@
 </p:sld>
 </file>
 
-<file path=ppt/slides/slide25.xml><?xml version="1.0" encoding="utf-8"?>
+<file path=ppt/slides/slide29.xml><?xml version="1.0" encoding="utf-8"?>
 <p:sld xmlns:a="http://schemas.openxmlformats.org/drawingml/2006/main" xmlns:r="http://schemas.openxmlformats.org/officeDocument/2006/relationships" xmlns:p="http://schemas.openxmlformats.org/presentationml/2006/main">
   <p:cSld>
     <p:spTree>
@@ -7279,7 +8321,98 @@
 </p:sld>
 </file>
 
-<file path=ppt/slides/slide26.xml><?xml version="1.0" encoding="utf-8"?>
+<file path=ppt/slides/slide3.xml><?xml version="1.0" encoding="utf-8"?>
+<p:sld xmlns:a="http://schemas.openxmlformats.org/drawingml/2006/main" xmlns:r="http://schemas.openxmlformats.org/officeDocument/2006/relationships" xmlns:p="http://schemas.openxmlformats.org/presentationml/2006/main">
+  <p:cSld>
+    <p:spTree>
+      <p:nvGrpSpPr>
+        <p:cNvPr id="1" name=""/>
+        <p:cNvGrpSpPr/>
+        <p:nvPr/>
+      </p:nvGrpSpPr>
+      <p:grpSpPr>
+        <a:xfrm>
+          <a:off x="0" y="0"/>
+          <a:ext cx="0" cy="0"/>
+          <a:chOff x="0" y="0"/>
+          <a:chExt cx="0" cy="0"/>
+        </a:xfrm>
+      </p:grpSpPr>
+      <p:pic>
+        <p:nvPicPr>
+          <p:cNvPr id="13314" name="Picture 2"/>
+          <p:cNvPicPr>
+            <a:picLocks noChangeAspect="1" noChangeArrowheads="1"/>
+          </p:cNvPicPr>
+          <p:nvPr/>
+        </p:nvPicPr>
+        <p:blipFill>
+          <a:blip r:embed="rId3">
+            <a:extLst>
+              <a:ext uri="{28A0092B-C50C-407E-A947-70E740481C1C}">
+                <a14:useLocalDpi xmlns:a14="http://schemas.microsoft.com/office/drawing/2010/main" val="0"/>
+              </a:ext>
+            </a:extLst>
+          </a:blip>
+          <a:srcRect/>
+          <a:stretch>
+            <a:fillRect/>
+          </a:stretch>
+        </p:blipFill>
+        <p:spPr bwMode="auto">
+          <a:xfrm>
+            <a:off x="166688" y="304800"/>
+            <a:ext cx="8810625" cy="5905500"/>
+          </a:xfrm>
+          <a:prstGeom prst="rect">
+            <a:avLst/>
+          </a:prstGeom>
+          <a:noFill/>
+          <a:ln>
+            <a:noFill/>
+          </a:ln>
+          <a:extLst>
+            <a:ext uri="{909E8E84-426E-40DD-AFC4-6F175D3DCCD1}">
+              <a14:hiddenFill xmlns:a14="http://schemas.microsoft.com/office/drawing/2010/main">
+                <a:solidFill>
+                  <a:schemeClr val="accent1"/>
+                </a:solidFill>
+              </a14:hiddenFill>
+            </a:ext>
+            <a:ext uri="{91240B29-F687-4F45-9708-019B960494DF}">
+              <a14:hiddenLine xmlns:a14="http://schemas.microsoft.com/office/drawing/2010/main" w="9525">
+                <a:solidFill>
+                  <a:schemeClr val="tx1"/>
+                </a:solidFill>
+                <a:miter lim="800000"/>
+                <a:headEnd/>
+                <a:tailEnd/>
+              </a14:hiddenLine>
+            </a:ext>
+          </a:extLst>
+        </p:spPr>
+      </p:pic>
+    </p:spTree>
+    <p:extLst>
+      <p:ext uri="{BB962C8B-B14F-4D97-AF65-F5344CB8AC3E}">
+        <p14:creationId xmlns:p14="http://schemas.microsoft.com/office/powerpoint/2010/main" val="4052604598"/>
+      </p:ext>
+    </p:extLst>
+  </p:cSld>
+  <p:clrMapOvr>
+    <a:masterClrMapping/>
+  </p:clrMapOvr>
+  <p:timing>
+    <p:tnLst>
+      <p:par>
+        <p:cTn id="1" dur="indefinite" restart="never" nodeType="tmRoot"/>
+      </p:par>
+    </p:tnLst>
+  </p:timing>
+</p:sld>
+</file>
+
+<file path=ppt/slides/slide30.xml><?xml version="1.0" encoding="utf-8"?>
 <p:sld xmlns:a="http://schemas.openxmlformats.org/drawingml/2006/main" xmlns:r="http://schemas.openxmlformats.org/officeDocument/2006/relationships" xmlns:p="http://schemas.openxmlformats.org/presentationml/2006/main">
   <p:cSld>
     <p:spTree>
@@ -7414,7 +8547,7 @@
 </p:sld>
 </file>
 
-<file path=ppt/slides/slide27.xml><?xml version="1.0" encoding="utf-8"?>
+<file path=ppt/slides/slide31.xml><?xml version="1.0" encoding="utf-8"?>
 <p:sld xmlns:a="http://schemas.openxmlformats.org/drawingml/2006/main" xmlns:r="http://schemas.openxmlformats.org/officeDocument/2006/relationships" xmlns:p="http://schemas.openxmlformats.org/presentationml/2006/main">
   <p:cSld>
     <p:spTree>
@@ -7559,7 +8692,7 @@
 </p:sld>
 </file>
 
-<file path=ppt/slides/slide28.xml><?xml version="1.0" encoding="utf-8"?>
+<file path=ppt/slides/slide32.xml><?xml version="1.0" encoding="utf-8"?>
 <p:sld xmlns:a="http://schemas.openxmlformats.org/drawingml/2006/main" xmlns:r="http://schemas.openxmlformats.org/officeDocument/2006/relationships" xmlns:p="http://schemas.openxmlformats.org/presentationml/2006/main">
   <p:cSld>
     <p:spTree>
@@ -7624,7 +8757,7 @@
 </p:sld>
 </file>
 
-<file path=ppt/slides/slide29.xml><?xml version="1.0" encoding="utf-8"?>
+<file path=ppt/slides/slide33.xml><?xml version="1.0" encoding="utf-8"?>
 <p:sld xmlns:a="http://schemas.openxmlformats.org/drawingml/2006/main" xmlns:r="http://schemas.openxmlformats.org/officeDocument/2006/relationships" xmlns:p="http://schemas.openxmlformats.org/presentationml/2006/main">
   <p:cSld>
     <p:spTree>
@@ -7731,98 +8864,7 @@
 </p:sld>
 </file>
 
-<file path=ppt/slides/slide3.xml><?xml version="1.0" encoding="utf-8"?>
-<p:sld xmlns:a="http://schemas.openxmlformats.org/drawingml/2006/main" xmlns:r="http://schemas.openxmlformats.org/officeDocument/2006/relationships" xmlns:p="http://schemas.openxmlformats.org/presentationml/2006/main">
-  <p:cSld>
-    <p:spTree>
-      <p:nvGrpSpPr>
-        <p:cNvPr id="1" name=""/>
-        <p:cNvGrpSpPr/>
-        <p:nvPr/>
-      </p:nvGrpSpPr>
-      <p:grpSpPr>
-        <a:xfrm>
-          <a:off x="0" y="0"/>
-          <a:ext cx="0" cy="0"/>
-          <a:chOff x="0" y="0"/>
-          <a:chExt cx="0" cy="0"/>
-        </a:xfrm>
-      </p:grpSpPr>
-      <p:pic>
-        <p:nvPicPr>
-          <p:cNvPr id="13314" name="Picture 2"/>
-          <p:cNvPicPr>
-            <a:picLocks noChangeAspect="1" noChangeArrowheads="1"/>
-          </p:cNvPicPr>
-          <p:nvPr/>
-        </p:nvPicPr>
-        <p:blipFill>
-          <a:blip r:embed="rId3">
-            <a:extLst>
-              <a:ext uri="{28A0092B-C50C-407E-A947-70E740481C1C}">
-                <a14:useLocalDpi xmlns:a14="http://schemas.microsoft.com/office/drawing/2010/main" val="0"/>
-              </a:ext>
-            </a:extLst>
-          </a:blip>
-          <a:srcRect/>
-          <a:stretch>
-            <a:fillRect/>
-          </a:stretch>
-        </p:blipFill>
-        <p:spPr bwMode="auto">
-          <a:xfrm>
-            <a:off x="166688" y="304800"/>
-            <a:ext cx="8810625" cy="5905500"/>
-          </a:xfrm>
-          <a:prstGeom prst="rect">
-            <a:avLst/>
-          </a:prstGeom>
-          <a:noFill/>
-          <a:ln>
-            <a:noFill/>
-          </a:ln>
-          <a:extLst>
-            <a:ext uri="{909E8E84-426E-40DD-AFC4-6F175D3DCCD1}">
-              <a14:hiddenFill xmlns:a14="http://schemas.microsoft.com/office/drawing/2010/main">
-                <a:solidFill>
-                  <a:schemeClr val="accent1"/>
-                </a:solidFill>
-              </a14:hiddenFill>
-            </a:ext>
-            <a:ext uri="{91240B29-F687-4F45-9708-019B960494DF}">
-              <a14:hiddenLine xmlns:a14="http://schemas.microsoft.com/office/drawing/2010/main" w="9525">
-                <a:solidFill>
-                  <a:schemeClr val="tx1"/>
-                </a:solidFill>
-                <a:miter lim="800000"/>
-                <a:headEnd/>
-                <a:tailEnd/>
-              </a14:hiddenLine>
-            </a:ext>
-          </a:extLst>
-        </p:spPr>
-      </p:pic>
-    </p:spTree>
-    <p:extLst>
-      <p:ext uri="{BB962C8B-B14F-4D97-AF65-F5344CB8AC3E}">
-        <p14:creationId xmlns:p14="http://schemas.microsoft.com/office/powerpoint/2010/main" val="4052604598"/>
-      </p:ext>
-    </p:extLst>
-  </p:cSld>
-  <p:clrMapOvr>
-    <a:masterClrMapping/>
-  </p:clrMapOvr>
-  <p:timing>
-    <p:tnLst>
-      <p:par>
-        <p:cTn id="1" dur="indefinite" restart="never" nodeType="tmRoot"/>
-      </p:par>
-    </p:tnLst>
-  </p:timing>
-</p:sld>
-</file>
-
-<file path=ppt/slides/slide30.xml><?xml version="1.0" encoding="utf-8"?>
+<file path=ppt/slides/slide34.xml><?xml version="1.0" encoding="utf-8"?>
 <p:sld xmlns:a="http://schemas.openxmlformats.org/drawingml/2006/main" xmlns:r="http://schemas.openxmlformats.org/officeDocument/2006/relationships" xmlns:p="http://schemas.openxmlformats.org/presentationml/2006/main">
   <p:cSld>
     <p:spTree>
@@ -7929,7 +8971,7 @@
 </p:sld>
 </file>
 
-<file path=ppt/slides/slide31.xml><?xml version="1.0" encoding="utf-8"?>
+<file path=ppt/slides/slide35.xml><?xml version="1.0" encoding="utf-8"?>
 <p:sld xmlns:a="http://schemas.openxmlformats.org/drawingml/2006/main" xmlns:r="http://schemas.openxmlformats.org/officeDocument/2006/relationships" xmlns:p="http://schemas.openxmlformats.org/presentationml/2006/main">
   <p:cSld>
     <p:spTree>
@@ -7996,7 +9038,7 @@
 </p:sld>
 </file>
 
-<file path=ppt/slides/slide32.xml><?xml version="1.0" encoding="utf-8"?>
+<file path=ppt/slides/slide36.xml><?xml version="1.0" encoding="utf-8"?>
 <p:sld xmlns:a="http://schemas.openxmlformats.org/drawingml/2006/main" xmlns:r="http://schemas.openxmlformats.org/officeDocument/2006/relationships" xmlns:p="http://schemas.openxmlformats.org/presentationml/2006/main">
   <p:cSld>
     <p:spTree>
@@ -8127,7 +9169,7 @@
 </p:sld>
 </file>
 
-<file path=ppt/slides/slide33.xml><?xml version="1.0" encoding="utf-8"?>
+<file path=ppt/slides/slide37.xml><?xml version="1.0" encoding="utf-8"?>
 <p:sld xmlns:a="http://schemas.openxmlformats.org/drawingml/2006/main" xmlns:r="http://schemas.openxmlformats.org/officeDocument/2006/relationships" xmlns:p="http://schemas.openxmlformats.org/presentationml/2006/main">
   <p:cSld>
     <p:spTree>
@@ -8192,7 +9234,7 @@
 </p:sld>
 </file>
 
-<file path=ppt/slides/slide34.xml><?xml version="1.0" encoding="utf-8"?>
+<file path=ppt/slides/slide38.xml><?xml version="1.0" encoding="utf-8"?>
 <p:sld xmlns:a="http://schemas.openxmlformats.org/drawingml/2006/main" xmlns:r="http://schemas.openxmlformats.org/officeDocument/2006/relationships" xmlns:p="http://schemas.openxmlformats.org/presentationml/2006/main">
   <p:cSld>
     <p:spTree>
@@ -8328,7 +9370,7 @@
 </p:sld>
 </file>
 
-<file path=ppt/slides/slide35.xml><?xml version="1.0" encoding="utf-8"?>
+<file path=ppt/slides/slide39.xml><?xml version="1.0" encoding="utf-8"?>
 <p:sld xmlns:a="http://schemas.openxmlformats.org/drawingml/2006/main" xmlns:r="http://schemas.openxmlformats.org/officeDocument/2006/relationships" xmlns:p="http://schemas.openxmlformats.org/presentationml/2006/main">
   <p:cSld>
     <p:spTree>
@@ -8487,7 +9529,107 @@
 </p:sld>
 </file>
 
-<file path=ppt/slides/slide36.xml><?xml version="1.0" encoding="utf-8"?>
+<file path=ppt/slides/slide4.xml><?xml version="1.0" encoding="utf-8"?>
+<p:sld xmlns:a="http://schemas.openxmlformats.org/drawingml/2006/main" xmlns:r="http://schemas.openxmlformats.org/officeDocument/2006/relationships" xmlns:p="http://schemas.openxmlformats.org/presentationml/2006/main">
+  <p:cSld>
+    <p:spTree>
+      <p:nvGrpSpPr>
+        <p:cNvPr id="1" name=""/>
+        <p:cNvGrpSpPr/>
+        <p:nvPr/>
+      </p:nvGrpSpPr>
+      <p:grpSpPr>
+        <a:xfrm>
+          <a:off x="0" y="0"/>
+          <a:ext cx="0" cy="0"/>
+          <a:chOff x="0" y="0"/>
+          <a:chExt cx="0" cy="0"/>
+        </a:xfrm>
+      </p:grpSpPr>
+      <p:sp>
+        <p:nvSpPr>
+          <p:cNvPr id="2" name="Title 1"/>
+          <p:cNvSpPr>
+            <a:spLocks noGrp="1"/>
+          </p:cNvSpPr>
+          <p:nvPr>
+            <p:ph type="title"/>
+          </p:nvPr>
+        </p:nvSpPr>
+        <p:spPr/>
+        <p:txBody>
+          <a:bodyPr/>
+          <a:lstStyle/>
+          <a:p>
+            <a:r>
+              <a:rPr lang="en-US" dirty="0" smtClean="0"/>
+              <a:t>Outline</a:t>
+            </a:r>
+            <a:endParaRPr lang="en-US" dirty="0"/>
+          </a:p>
+        </p:txBody>
+      </p:sp>
+      <p:sp>
+        <p:nvSpPr>
+          <p:cNvPr id="3" name="Content Placeholder 2"/>
+          <p:cNvSpPr>
+            <a:spLocks noGrp="1"/>
+          </p:cNvSpPr>
+          <p:nvPr>
+            <p:ph idx="1"/>
+          </p:nvPr>
+        </p:nvSpPr>
+        <p:spPr/>
+        <p:txBody>
+          <a:bodyPr/>
+          <a:lstStyle/>
+          <a:p>
+            <a:r>
+              <a:rPr lang="en-US" dirty="0" smtClean="0"/>
+              <a:t>Overview of NHANES</a:t>
+            </a:r>
+          </a:p>
+          <a:p>
+            <a:r>
+              <a:rPr lang="en-US" dirty="0" smtClean="0"/>
+              <a:t>Where to find it</a:t>
+            </a:r>
+          </a:p>
+          <a:p>
+            <a:r>
+              <a:rPr lang="en-US" dirty="0" smtClean="0"/>
+              <a:t>Nitty-gritty data details</a:t>
+            </a:r>
+          </a:p>
+          <a:p>
+            <a:r>
+              <a:rPr lang="en-US" dirty="0" smtClean="0"/>
+              <a:t>Analyses</a:t>
+            </a:r>
+          </a:p>
+        </p:txBody>
+      </p:sp>
+    </p:spTree>
+    <p:extLst>
+      <p:ext uri="{BB962C8B-B14F-4D97-AF65-F5344CB8AC3E}">
+        <p14:creationId xmlns:p14="http://schemas.microsoft.com/office/powerpoint/2010/main" val="310356983"/>
+      </p:ext>
+    </p:extLst>
+  </p:cSld>
+  <p:clrMapOvr>
+    <a:masterClrMapping/>
+  </p:clrMapOvr>
+  <p:timing>
+    <p:tnLst>
+      <p:par>
+        <p:cTn id="1" dur="indefinite" restart="never" nodeType="tmRoot"/>
+      </p:par>
+    </p:tnLst>
+  </p:timing>
+</p:sld>
+</file>
+
+<file path=ppt/slides/slide40.xml><?xml version="1.0" encoding="utf-8"?>
 <p:sld xmlns:a="http://schemas.openxmlformats.org/drawingml/2006/main" xmlns:r="http://schemas.openxmlformats.org/officeDocument/2006/relationships" xmlns:p="http://schemas.openxmlformats.org/presentationml/2006/main">
   <p:cSld>
     <p:spTree>
@@ -8554,7 +9696,7 @@
 </p:sld>
 </file>
 
-<file path=ppt/slides/slide37.xml><?xml version="1.0" encoding="utf-8"?>
+<file path=ppt/slides/slide41.xml><?xml version="1.0" encoding="utf-8"?>
 <p:sld xmlns:a="http://schemas.openxmlformats.org/drawingml/2006/main" xmlns:r="http://schemas.openxmlformats.org/officeDocument/2006/relationships" xmlns:p="http://schemas.openxmlformats.org/presentationml/2006/main">
   <p:cSld>
     <p:spTree>
@@ -8645,7 +9787,7 @@
 </p:sld>
 </file>
 
-<file path=ppt/slides/slide38.xml><?xml version="1.0" encoding="utf-8"?>
+<file path=ppt/slides/slide42.xml><?xml version="1.0" encoding="utf-8"?>
 <p:sld xmlns:a="http://schemas.openxmlformats.org/drawingml/2006/main" xmlns:r="http://schemas.openxmlformats.org/officeDocument/2006/relationships" xmlns:p="http://schemas.openxmlformats.org/presentationml/2006/main">
   <p:cSld>
     <p:spTree>
@@ -8893,7 +10035,7 @@
 </p:sld>
 </file>
 
-<file path=ppt/slides/slide39.xml><?xml version="1.0" encoding="utf-8"?>
+<file path=ppt/slides/slide43.xml><?xml version="1.0" encoding="utf-8"?>
 <p:sld xmlns:a="http://schemas.openxmlformats.org/drawingml/2006/main" xmlns:r="http://schemas.openxmlformats.org/officeDocument/2006/relationships" xmlns:p="http://schemas.openxmlformats.org/presentationml/2006/main">
   <p:cSld>
     <p:spTree>
@@ -8960,107 +10102,7 @@
 </p:sld>
 </file>
 
-<file path=ppt/slides/slide4.xml><?xml version="1.0" encoding="utf-8"?>
-<p:sld xmlns:a="http://schemas.openxmlformats.org/drawingml/2006/main" xmlns:r="http://schemas.openxmlformats.org/officeDocument/2006/relationships" xmlns:p="http://schemas.openxmlformats.org/presentationml/2006/main">
-  <p:cSld>
-    <p:spTree>
-      <p:nvGrpSpPr>
-        <p:cNvPr id="1" name=""/>
-        <p:cNvGrpSpPr/>
-        <p:nvPr/>
-      </p:nvGrpSpPr>
-      <p:grpSpPr>
-        <a:xfrm>
-          <a:off x="0" y="0"/>
-          <a:ext cx="0" cy="0"/>
-          <a:chOff x="0" y="0"/>
-          <a:chExt cx="0" cy="0"/>
-        </a:xfrm>
-      </p:grpSpPr>
-      <p:sp>
-        <p:nvSpPr>
-          <p:cNvPr id="2" name="Title 1"/>
-          <p:cNvSpPr>
-            <a:spLocks noGrp="1"/>
-          </p:cNvSpPr>
-          <p:nvPr>
-            <p:ph type="title"/>
-          </p:nvPr>
-        </p:nvSpPr>
-        <p:spPr/>
-        <p:txBody>
-          <a:bodyPr/>
-          <a:lstStyle/>
-          <a:p>
-            <a:r>
-              <a:rPr lang="en-US" dirty="0" smtClean="0"/>
-              <a:t>Outline</a:t>
-            </a:r>
-            <a:endParaRPr lang="en-US" dirty="0"/>
-          </a:p>
-        </p:txBody>
-      </p:sp>
-      <p:sp>
-        <p:nvSpPr>
-          <p:cNvPr id="3" name="Content Placeholder 2"/>
-          <p:cNvSpPr>
-            <a:spLocks noGrp="1"/>
-          </p:cNvSpPr>
-          <p:nvPr>
-            <p:ph idx="1"/>
-          </p:nvPr>
-        </p:nvSpPr>
-        <p:spPr/>
-        <p:txBody>
-          <a:bodyPr/>
-          <a:lstStyle/>
-          <a:p>
-            <a:r>
-              <a:rPr lang="en-US" dirty="0" smtClean="0"/>
-              <a:t>Overview of NHANES</a:t>
-            </a:r>
-          </a:p>
-          <a:p>
-            <a:r>
-              <a:rPr lang="en-US" dirty="0" smtClean="0"/>
-              <a:t>Where to find it</a:t>
-            </a:r>
-          </a:p>
-          <a:p>
-            <a:r>
-              <a:rPr lang="en-US" dirty="0" smtClean="0"/>
-              <a:t>Nitty-gritty data details</a:t>
-            </a:r>
-          </a:p>
-          <a:p>
-            <a:r>
-              <a:rPr lang="en-US" dirty="0" smtClean="0"/>
-              <a:t>Analyses</a:t>
-            </a:r>
-          </a:p>
-        </p:txBody>
-      </p:sp>
-    </p:spTree>
-    <p:extLst>
-      <p:ext uri="{BB962C8B-B14F-4D97-AF65-F5344CB8AC3E}">
-        <p14:creationId xmlns:p14="http://schemas.microsoft.com/office/powerpoint/2010/main" val="310356983"/>
-      </p:ext>
-    </p:extLst>
-  </p:cSld>
-  <p:clrMapOvr>
-    <a:masterClrMapping/>
-  </p:clrMapOvr>
-  <p:timing>
-    <p:tnLst>
-      <p:par>
-        <p:cTn id="1" dur="indefinite" restart="never" nodeType="tmRoot"/>
-      </p:par>
-    </p:tnLst>
-  </p:timing>
-</p:sld>
-</file>
-
-<file path=ppt/slides/slide40.xml><?xml version="1.0" encoding="utf-8"?>
+<file path=ppt/slides/slide44.xml><?xml version="1.0" encoding="utf-8"?>
 <p:sld xmlns:a="http://schemas.openxmlformats.org/drawingml/2006/main" xmlns:r="http://schemas.openxmlformats.org/officeDocument/2006/relationships" xmlns:p="http://schemas.openxmlformats.org/presentationml/2006/main">
   <p:cSld>
     <p:spTree>
@@ -9151,7 +10193,7 @@
 </p:sld>
 </file>
 
-<file path=ppt/slides/slide41.xml><?xml version="1.0" encoding="utf-8"?>
+<file path=ppt/slides/slide45.xml><?xml version="1.0" encoding="utf-8"?>
 <p:sld xmlns:a="http://schemas.openxmlformats.org/drawingml/2006/main" xmlns:r="http://schemas.openxmlformats.org/officeDocument/2006/relationships" xmlns:p="http://schemas.openxmlformats.org/presentationml/2006/main">
   <p:cSld>
     <p:spTree>
@@ -9407,7 +10449,7 @@
 </p:sld>
 </file>
 
-<file path=ppt/slides/slide42.xml><?xml version="1.0" encoding="utf-8"?>
+<file path=ppt/slides/slide46.xml><?xml version="1.0" encoding="utf-8"?>
 <p:sld xmlns:a="http://schemas.openxmlformats.org/drawingml/2006/main" xmlns:r="http://schemas.openxmlformats.org/officeDocument/2006/relationships" xmlns:p="http://schemas.openxmlformats.org/presentationml/2006/main">
   <p:cSld>
     <p:spTree>
@@ -9465,6 +10507,195 @@
     <p:extLst>
       <p:ext uri="{BB962C8B-B14F-4D97-AF65-F5344CB8AC3E}">
         <p14:creationId xmlns:p14="http://schemas.microsoft.com/office/powerpoint/2010/main" val="858168477"/>
+      </p:ext>
+    </p:extLst>
+  </p:cSld>
+  <p:clrMapOvr>
+    <a:masterClrMapping/>
+  </p:clrMapOvr>
+  <p:timing>
+    <p:tnLst>
+      <p:par>
+        <p:cTn id="1" dur="indefinite" restart="never" nodeType="tmRoot"/>
+      </p:par>
+    </p:tnLst>
+  </p:timing>
+</p:sld>
+</file>
+
+<file path=ppt/slides/slide47.xml><?xml version="1.0" encoding="utf-8"?>
+<p:sld xmlns:a="http://schemas.openxmlformats.org/drawingml/2006/main" xmlns:r="http://schemas.openxmlformats.org/officeDocument/2006/relationships" xmlns:p="http://schemas.openxmlformats.org/presentationml/2006/main">
+  <p:cSld>
+    <p:spTree>
+      <p:nvGrpSpPr>
+        <p:cNvPr id="1" name=""/>
+        <p:cNvGrpSpPr/>
+        <p:nvPr/>
+      </p:nvGrpSpPr>
+      <p:grpSpPr>
+        <a:xfrm>
+          <a:off x="0" y="0"/>
+          <a:ext cx="0" cy="0"/>
+          <a:chOff x="0" y="0"/>
+          <a:chExt cx="0" cy="0"/>
+        </a:xfrm>
+      </p:grpSpPr>
+      <p:sp>
+        <p:nvSpPr>
+          <p:cNvPr id="2" name="Title 1"/>
+          <p:cNvSpPr>
+            <a:spLocks noGrp="1"/>
+          </p:cNvSpPr>
+          <p:nvPr>
+            <p:ph type="title"/>
+          </p:nvPr>
+        </p:nvSpPr>
+        <p:spPr/>
+        <p:txBody>
+          <a:bodyPr/>
+          <a:lstStyle/>
+          <a:p>
+            <a:r>
+              <a:rPr lang="en-US" dirty="0" smtClean="0"/>
+              <a:t>Outline</a:t>
+            </a:r>
+            <a:endParaRPr lang="en-US" dirty="0"/>
+          </a:p>
+        </p:txBody>
+      </p:sp>
+      <p:sp>
+        <p:nvSpPr>
+          <p:cNvPr id="3" name="Content Placeholder 2"/>
+          <p:cNvSpPr>
+            <a:spLocks noGrp="1"/>
+          </p:cNvSpPr>
+          <p:nvPr>
+            <p:ph idx="1"/>
+          </p:nvPr>
+        </p:nvSpPr>
+        <p:spPr/>
+        <p:txBody>
+          <a:bodyPr/>
+          <a:lstStyle/>
+          <a:p>
+            <a:r>
+              <a:rPr lang="en-US" dirty="0" smtClean="0"/>
+              <a:t>Overview of NHANES</a:t>
+            </a:r>
+          </a:p>
+          <a:p>
+            <a:r>
+              <a:rPr lang="en-US" dirty="0" smtClean="0"/>
+              <a:t>Where to find it</a:t>
+            </a:r>
+          </a:p>
+          <a:p>
+            <a:r>
+              <a:rPr lang="en-US" dirty="0" smtClean="0"/>
+              <a:t>Nitty-gritty data details</a:t>
+            </a:r>
+          </a:p>
+          <a:p>
+            <a:r>
+              <a:rPr lang="en-US" dirty="0" smtClean="0"/>
+              <a:t>Analyses</a:t>
+            </a:r>
+          </a:p>
+          <a:p>
+            <a:endParaRPr lang="en-US" dirty="0" smtClean="0"/>
+          </a:p>
+        </p:txBody>
+      </p:sp>
+    </p:spTree>
+    <p:extLst>
+      <p:ext uri="{BB962C8B-B14F-4D97-AF65-F5344CB8AC3E}">
+        <p14:creationId xmlns:p14="http://schemas.microsoft.com/office/powerpoint/2010/main" val="3435925266"/>
+      </p:ext>
+    </p:extLst>
+  </p:cSld>
+  <p:clrMapOvr>
+    <a:masterClrMapping/>
+  </p:clrMapOvr>
+  <p:timing>
+    <p:tnLst>
+      <p:par>
+        <p:cTn id="1" dur="indefinite" restart="never" nodeType="tmRoot"/>
+      </p:par>
+    </p:tnLst>
+  </p:timing>
+</p:sld>
+</file>
+
+<file path=ppt/slides/slide48.xml><?xml version="1.0" encoding="utf-8"?>
+<p:sld xmlns:a="http://schemas.openxmlformats.org/drawingml/2006/main" xmlns:r="http://schemas.openxmlformats.org/officeDocument/2006/relationships" xmlns:p="http://schemas.openxmlformats.org/presentationml/2006/main">
+  <p:cSld>
+    <p:spTree>
+      <p:nvGrpSpPr>
+        <p:cNvPr id="1" name=""/>
+        <p:cNvGrpSpPr/>
+        <p:nvPr/>
+      </p:nvGrpSpPr>
+      <p:grpSpPr>
+        <a:xfrm>
+          <a:off x="0" y="0"/>
+          <a:ext cx="0" cy="0"/>
+          <a:chOff x="0" y="0"/>
+          <a:chExt cx="0" cy="0"/>
+        </a:xfrm>
+      </p:grpSpPr>
+      <p:sp>
+        <p:nvSpPr>
+          <p:cNvPr id="2" name="Title 1"/>
+          <p:cNvSpPr>
+            <a:spLocks noGrp="1"/>
+          </p:cNvSpPr>
+          <p:nvPr>
+            <p:ph type="title"/>
+          </p:nvPr>
+        </p:nvSpPr>
+        <p:spPr/>
+        <p:txBody>
+          <a:bodyPr/>
+          <a:lstStyle/>
+          <a:p>
+            <a:r>
+              <a:rPr lang="en-US" dirty="0" smtClean="0"/>
+              <a:t>Outline</a:t>
+            </a:r>
+            <a:endParaRPr lang="en-US" dirty="0"/>
+          </a:p>
+        </p:txBody>
+      </p:sp>
+      <p:sp>
+        <p:nvSpPr>
+          <p:cNvPr id="3" name="Content Placeholder 2"/>
+          <p:cNvSpPr>
+            <a:spLocks noGrp="1"/>
+          </p:cNvSpPr>
+          <p:nvPr>
+            <p:ph idx="1"/>
+          </p:nvPr>
+        </p:nvSpPr>
+        <p:spPr/>
+        <p:txBody>
+          <a:bodyPr/>
+          <a:lstStyle/>
+          <a:p>
+            <a:r>
+              <a:rPr lang="en-US" dirty="0" smtClean="0"/>
+              <a:t>Questions?</a:t>
+            </a:r>
+            <a:endParaRPr lang="en-US" dirty="0" smtClean="0"/>
+          </a:p>
+          <a:p>
+            <a:endParaRPr lang="en-US" dirty="0" smtClean="0"/>
+          </a:p>
+        </p:txBody>
+      </p:sp>
+    </p:spTree>
+    <p:extLst>
+      <p:ext uri="{BB962C8B-B14F-4D97-AF65-F5344CB8AC3E}">
+        <p14:creationId xmlns:p14="http://schemas.microsoft.com/office/powerpoint/2010/main" val="2431936953"/>
       </p:ext>
     </p:extLst>
   </p:cSld>

</xml_diff>